<commit_message>
Update Education Comittee Agenda_20210609.pptx
Updated 2021-06-09 Slides
</commit_message>
<xml_diff>
--- a/meetings/2021-06-09/Education Comittee Agenda_20210609.pptx
+++ b/meetings/2021-06-09/Education Comittee Agenda_20210609.pptx
@@ -7980,7 +7980,7 @@
           <a:p>
             <a:fld id="{602CCF63-8CDD-4662-86EA-89AB10285AEA}" type="datetimeFigureOut">
               <a:rPr lang="en-US" smtClean="0"/>
-              <a:t>6/8/2021</a:t>
+              <a:t>8/28/2021</a:t>
             </a:fld>
             <a:endParaRPr lang="en-US"/>
           </a:p>
@@ -11788,8 +11788,12 @@
           <a:lstStyle/>
           <a:p>
             <a:r>
+              <a:rPr lang="en-US"/>
+              <a:t>June 09, </a:t>
+            </a:r>
+            <a:r>
               <a:rPr lang="en-US" dirty="0"/>
-              <a:t>June 06, 2021</a:t>
+              <a:t>2021</a:t>
             </a:r>
           </a:p>
         </p:txBody>
@@ -13196,21 +13200,6 @@
 </file>
 
 <file path=customXml/item1.xml><?xml version="1.0" encoding="utf-8"?>
-<?mso-contentType ?>
-<FormTemplates xmlns="http://schemas.microsoft.com/sharepoint/v3/contenttype/forms">
-  <Display>DocumentLibraryForm</Display>
-  <Edit>DocumentLibraryForm</Edit>
-  <New>DocumentLibraryForm</New>
-</FormTemplates>
-</file>
-
-<file path=customXml/item2.xml><?xml version="1.0" encoding="utf-8"?>
-<p:properties xmlns:p="http://schemas.microsoft.com/office/2006/metadata/properties" xmlns:xsi="http://www.w3.org/2001/XMLSchema-instance" xmlns:pc="http://schemas.microsoft.com/office/infopath/2007/PartnerControls">
-  <documentManagement/>
-</p:properties>
-</file>
-
-<file path=customXml/item3.xml><?xml version="1.0" encoding="utf-8"?>
 <ct:contentTypeSchema xmlns:ct="http://schemas.microsoft.com/office/2006/metadata/contentType" xmlns:ma="http://schemas.microsoft.com/office/2006/metadata/properties/metaAttributes" ct:_="" ma:_="" ma:contentTypeName="Document" ma:contentTypeID="0x010100D8585DBE9BB8F44C9DF171978FAFAB3B" ma:contentTypeVersion="10" ma:contentTypeDescription="Create a new document." ma:contentTypeScope="" ma:versionID="8e60a5d68795553ef1443b0b1dcfe4f1">
   <xsd:schema xmlns:xsd="http://www.w3.org/2001/XMLSchema" xmlns:xs="http://www.w3.org/2001/XMLSchema" xmlns:p="http://schemas.microsoft.com/office/2006/metadata/properties" xmlns:ns2="6fe20351-a309-42a3-9b27-5e5ffd43b297" xmlns:ns3="4e2b238c-3895-4622-a32d-2bea345cbf28" targetNamespace="http://schemas.microsoft.com/office/2006/metadata/properties" ma:root="true" ma:fieldsID="cf8e4bcfe1dedb61c8503da3c6e4d241" ns2:_="" ns3:_="">
     <xsd:import namespace="6fe20351-a309-42a3-9b27-5e5ffd43b297"/>
@@ -13413,10 +13402,36 @@
 </ct:contentTypeSchema>
 </file>
 
+<file path=customXml/item2.xml><?xml version="1.0" encoding="utf-8"?>
+<p:properties xmlns:p="http://schemas.microsoft.com/office/2006/metadata/properties" xmlns:xsi="http://www.w3.org/2001/XMLSchema-instance" xmlns:pc="http://schemas.microsoft.com/office/infopath/2007/PartnerControls">
+  <documentManagement/>
+</p:properties>
+</file>
+
+<file path=customXml/item3.xml><?xml version="1.0" encoding="utf-8"?>
+<?mso-contentType ?>
+<FormTemplates xmlns="http://schemas.microsoft.com/sharepoint/v3/contenttype/forms">
+  <Display>DocumentLibraryForm</Display>
+  <Edit>DocumentLibraryForm</Edit>
+  <New>DocumentLibraryForm</New>
+</FormTemplates>
+</file>
+
 <file path=customXml/itemProps1.xml><?xml version="1.0" encoding="utf-8"?>
-<ds:datastoreItem xmlns:ds="http://schemas.openxmlformats.org/officeDocument/2006/customXml" ds:itemID="{BC323E2C-A3FD-4E1A-97D7-D2380EE03600}">
+<ds:datastoreItem xmlns:ds="http://schemas.openxmlformats.org/officeDocument/2006/customXml" ds:itemID="{4B78139F-4E90-4E16-8C61-B3F41403910A}">
   <ds:schemaRefs>
-    <ds:schemaRef ds:uri="http://schemas.microsoft.com/sharepoint/v3/contenttype/forms"/>
+    <ds:schemaRef ds:uri="http://schemas.microsoft.com/office/2006/metadata/contentType"/>
+    <ds:schemaRef ds:uri="http://schemas.microsoft.com/office/2006/metadata/properties/metaAttributes"/>
+    <ds:schemaRef ds:uri="http://www.w3.org/2001/XMLSchema"/>
+    <ds:schemaRef ds:uri="http://schemas.microsoft.com/office/2006/metadata/properties"/>
+    <ds:schemaRef ds:uri="6fe20351-a309-42a3-9b27-5e5ffd43b297"/>
+    <ds:schemaRef ds:uri="4e2b238c-3895-4622-a32d-2bea345cbf28"/>
+    <ds:schemaRef ds:uri="http://schemas.microsoft.com/office/2006/documentManagement/types"/>
+    <ds:schemaRef ds:uri="http://schemas.microsoft.com/office/infopath/2007/PartnerControls"/>
+    <ds:schemaRef ds:uri="http://schemas.openxmlformats.org/package/2006/metadata/core-properties"/>
+    <ds:schemaRef ds:uri="http://purl.org/dc/elements/1.1/"/>
+    <ds:schemaRef ds:uri="http://purl.org/dc/terms/"/>
+    <ds:schemaRef ds:uri="http://schemas.microsoft.com/internal/obd"/>
   </ds:schemaRefs>
 </ds:datastoreItem>
 </file>
@@ -13439,20 +13454,9 @@
 </file>
 
 <file path=customXml/itemProps3.xml><?xml version="1.0" encoding="utf-8"?>
-<ds:datastoreItem xmlns:ds="http://schemas.openxmlformats.org/officeDocument/2006/customXml" ds:itemID="{4B78139F-4E90-4E16-8C61-B3F41403910A}">
+<ds:datastoreItem xmlns:ds="http://schemas.openxmlformats.org/officeDocument/2006/customXml" ds:itemID="{BC323E2C-A3FD-4E1A-97D7-D2380EE03600}">
   <ds:schemaRefs>
-    <ds:schemaRef ds:uri="http://schemas.microsoft.com/office/2006/metadata/contentType"/>
-    <ds:schemaRef ds:uri="http://schemas.microsoft.com/office/2006/metadata/properties/metaAttributes"/>
-    <ds:schemaRef ds:uri="http://www.w3.org/2001/XMLSchema"/>
-    <ds:schemaRef ds:uri="http://schemas.microsoft.com/office/2006/metadata/properties"/>
-    <ds:schemaRef ds:uri="6fe20351-a309-42a3-9b27-5e5ffd43b297"/>
-    <ds:schemaRef ds:uri="4e2b238c-3895-4622-a32d-2bea345cbf28"/>
-    <ds:schemaRef ds:uri="http://schemas.microsoft.com/office/2006/documentManagement/types"/>
-    <ds:schemaRef ds:uri="http://schemas.microsoft.com/office/infopath/2007/PartnerControls"/>
-    <ds:schemaRef ds:uri="http://schemas.openxmlformats.org/package/2006/metadata/core-properties"/>
-    <ds:schemaRef ds:uri="http://purl.org/dc/elements/1.1/"/>
-    <ds:schemaRef ds:uri="http://purl.org/dc/terms/"/>
-    <ds:schemaRef ds:uri="http://schemas.microsoft.com/internal/obd"/>
+    <ds:schemaRef ds:uri="http://schemas.microsoft.com/sharepoint/v3/contenttype/forms"/>
   </ds:schemaRefs>
 </ds:datastoreItem>
 </file>
</xml_diff>